<commit_message>
git intro updates 2025
</commit_message>
<xml_diff>
--- a/Day1/intro_to_git.pptx
+++ b/Day1/intro_to_git.pptx
@@ -210,7 +210,7 @@
           <a:p>
             <a:fld id="{804BB16D-6A3A-0143-BE35-4D7955F2C534}" type="datetimeFigureOut">
               <a:rPr lang="en-US" smtClean="0"/>
-              <a:t>7/11/24</a:t>
+              <a:t>8/3/25</a:t>
             </a:fld>
             <a:endParaRPr lang="en-US"/>
           </a:p>
@@ -733,7 +733,7 @@
           <a:p>
             <a:fld id="{34073DC1-AB27-4363-9845-555972D7C4F0}" type="datetimeFigureOut">
               <a:rPr lang="en-US" smtClean="0"/>
-              <a:t>7/11/24</a:t>
+              <a:t>8/3/25</a:t>
             </a:fld>
             <a:endParaRPr lang="en-US"/>
           </a:p>
@@ -931,7 +931,7 @@
           <a:p>
             <a:fld id="{34073DC1-AB27-4363-9845-555972D7C4F0}" type="datetimeFigureOut">
               <a:rPr lang="en-US" smtClean="0"/>
-              <a:t>7/11/24</a:t>
+              <a:t>8/3/25</a:t>
             </a:fld>
             <a:endParaRPr lang="en-US"/>
           </a:p>
@@ -1139,7 +1139,7 @@
           <a:p>
             <a:fld id="{34073DC1-AB27-4363-9845-555972D7C4F0}" type="datetimeFigureOut">
               <a:rPr lang="en-US" smtClean="0"/>
-              <a:t>7/11/24</a:t>
+              <a:t>8/3/25</a:t>
             </a:fld>
             <a:endParaRPr lang="en-US"/>
           </a:p>
@@ -1337,7 +1337,7 @@
           <a:p>
             <a:fld id="{34073DC1-AB27-4363-9845-555972D7C4F0}" type="datetimeFigureOut">
               <a:rPr lang="en-US" smtClean="0"/>
-              <a:t>7/11/24</a:t>
+              <a:t>8/3/25</a:t>
             </a:fld>
             <a:endParaRPr lang="en-US"/>
           </a:p>
@@ -1612,7 +1612,7 @@
           <a:p>
             <a:fld id="{34073DC1-AB27-4363-9845-555972D7C4F0}" type="datetimeFigureOut">
               <a:rPr lang="en-US" smtClean="0"/>
-              <a:t>7/11/24</a:t>
+              <a:t>8/3/25</a:t>
             </a:fld>
             <a:endParaRPr lang="en-US"/>
           </a:p>
@@ -1877,7 +1877,7 @@
           <a:p>
             <a:fld id="{34073DC1-AB27-4363-9845-555972D7C4F0}" type="datetimeFigureOut">
               <a:rPr lang="en-US" smtClean="0"/>
-              <a:t>7/11/24</a:t>
+              <a:t>8/3/25</a:t>
             </a:fld>
             <a:endParaRPr lang="en-US"/>
           </a:p>
@@ -2289,7 +2289,7 @@
           <a:p>
             <a:fld id="{34073DC1-AB27-4363-9845-555972D7C4F0}" type="datetimeFigureOut">
               <a:rPr lang="en-US" smtClean="0"/>
-              <a:t>7/11/24</a:t>
+              <a:t>8/3/25</a:t>
             </a:fld>
             <a:endParaRPr lang="en-US"/>
           </a:p>
@@ -2430,7 +2430,7 @@
           <a:p>
             <a:fld id="{34073DC1-AB27-4363-9845-555972D7C4F0}" type="datetimeFigureOut">
               <a:rPr lang="en-US" smtClean="0"/>
-              <a:t>7/11/24</a:t>
+              <a:t>8/3/25</a:t>
             </a:fld>
             <a:endParaRPr lang="en-US"/>
           </a:p>
@@ -2543,7 +2543,7 @@
           <a:p>
             <a:fld id="{34073DC1-AB27-4363-9845-555972D7C4F0}" type="datetimeFigureOut">
               <a:rPr lang="en-US" smtClean="0"/>
-              <a:t>7/11/24</a:t>
+              <a:t>8/3/25</a:t>
             </a:fld>
             <a:endParaRPr lang="en-US"/>
           </a:p>
@@ -2854,7 +2854,7 @@
           <a:p>
             <a:fld id="{34073DC1-AB27-4363-9845-555972D7C4F0}" type="datetimeFigureOut">
               <a:rPr lang="en-US" smtClean="0"/>
-              <a:t>7/11/24</a:t>
+              <a:t>8/3/25</a:t>
             </a:fld>
             <a:endParaRPr lang="en-US"/>
           </a:p>
@@ -3142,7 +3142,7 @@
           <a:p>
             <a:fld id="{34073DC1-AB27-4363-9845-555972D7C4F0}" type="datetimeFigureOut">
               <a:rPr lang="en-US" smtClean="0"/>
-              <a:t>7/11/24</a:t>
+              <a:t>8/3/25</a:t>
             </a:fld>
             <a:endParaRPr lang="en-US"/>
           </a:p>
@@ -3383,7 +3383,7 @@
           <a:p>
             <a:fld id="{34073DC1-AB27-4363-9845-555972D7C4F0}" type="datetimeFigureOut">
               <a:rPr lang="en-US" smtClean="0"/>
-              <a:t>7/11/24</a:t>
+              <a:t>8/3/25</a:t>
             </a:fld>
             <a:endParaRPr lang="en-US"/>
           </a:p>
@@ -3861,7 +3861,7 @@
           <a:p>
             <a:r>
               <a:rPr lang="en-US" dirty="0"/>
-              <a:t>Code/Astro 2024</a:t>
+              <a:t>Code/Astro 2025</a:t>
             </a:r>
           </a:p>
         </p:txBody>
@@ -4931,15 +4931,7 @@
             <a:pPr lvl="1"/>
             <a:r>
               <a:rPr lang="en-US" dirty="0"/>
-              <a:t>Make a git repository in </a:t>
-            </a:r>
-            <a:r>
-              <a:rPr lang="en-US" dirty="0" err="1"/>
-              <a:t>Github</a:t>
-            </a:r>
-            <a:r>
-              <a:rPr lang="en-US" dirty="0"/>
-              <a:t> and “copy” it to your local machine</a:t>
+              <a:t>Make a git repository in GitHub and “copy” it to your local machine</a:t>
             </a:r>
           </a:p>
           <a:p>
@@ -4973,7 +4965,7 @@
             </a:pPr>
             <a:r>
               <a:rPr lang="en-US" dirty="0"/>
-              <a:t>Try to type along with me as we walk through the demo. However, don’t worry if you get stuck! We’ll have time at the end to work on the demo in groups. </a:t>
+              <a:t>Don’t try to type along with me as we walk through the demo. We’ll have time at the end to work on the demo in groups. </a:t>
             </a:r>
           </a:p>
           <a:p>
@@ -5058,7 +5050,9 @@
         </p:nvSpPr>
         <p:spPr/>
         <p:txBody>
-          <a:bodyPr/>
+          <a:bodyPr>
+            <a:normAutofit lnSpcReduction="10000"/>
+          </a:bodyPr>
           <a:lstStyle/>
           <a:p>
             <a:pPr marL="0" indent="0">
@@ -5072,7 +5066,7 @@
           <a:p>
             <a:r>
               <a:rPr lang="en-US" sz="2200" dirty="0"/>
-              <a:t>Any problems reproducing the commands we discussed in the demo? Work together to see if you can resolve any issues as a group. Otherwise, ask for help.</a:t>
+              <a:t>Work together to reproduce the steps of the demo. Ask for help if you need it!</a:t>
             </a:r>
           </a:p>
           <a:p>
@@ -5094,6 +5088,27 @@
             <a:r>
               <a:rPr lang="en-US" sz="2200" dirty="0"/>
               <a:t>Choose a group member. Everyone clone the demo repo of that member, and then try to edit the same file and push to the repo. Can you resolve any conflicts that arise?</a:t>
+            </a:r>
+          </a:p>
+          <a:p>
+            <a:endParaRPr lang="en-US" sz="2200" dirty="0"/>
+          </a:p>
+          <a:p>
+            <a:pPr marL="0" indent="0">
+              <a:buNone/>
+            </a:pPr>
+            <a:r>
+              <a:rPr lang="en-US" sz="2200" dirty="0"/>
+              <a:t>NOTE: To push to the same repository, the repository creator will need to add others as collaborators. To do this from the repo’s homepage:</a:t>
+            </a:r>
+          </a:p>
+          <a:p>
+            <a:pPr marL="0" indent="0">
+              <a:buNone/>
+            </a:pPr>
+            <a:r>
+              <a:rPr lang="en-US" sz="2200" dirty="0"/>
+              <a:t>Settings -&gt; Collaborators -&gt; Add People (next to Manage Access) </a:t>
             </a:r>
           </a:p>
         </p:txBody>
@@ -5860,7 +5875,7 @@
                 <a:cs typeface="Courier New"/>
                 <a:sym typeface="Courier New"/>
               </a:rPr>
-              <a:t>&gt; git stash apply</a:t>
+              <a:t>&gt; git stash pop</a:t>
             </a:r>
           </a:p>
           <a:p>
@@ -6263,7 +6278,7 @@
           <a:p>
             <a:r>
               <a:rPr lang="en-US" dirty="0"/>
-              <a:t>”git commit” and “git push” changes early and often! The smaller units these changes are, the easier they are to work with</a:t>
+              <a:t>“git commit” and “git push” changes early and often! The smaller units these changes are, the easier they are to work with</a:t>
             </a:r>
           </a:p>
           <a:p>

</xml_diff>